<commit_message>
Added 3_conditions, scanf and switch
</commit_message>
<xml_diff>
--- a/slides/0_Introduction.pptx
+++ b/slides/0_Introduction.pptx
@@ -225,7 +225,7 @@
           <a:p>
             <a:fld id="{85EF5437-F444-4613-A039-4AD69D91C86A}" type="datetimeFigureOut">
               <a:rPr lang="ru-RU" smtClean="0"/>
-              <a:t>10.09.2023</a:t>
+              <a:t>16.09.2023</a:t>
             </a:fld>
             <a:endParaRPr lang="ru-RU"/>
           </a:p>
@@ -2051,7 +2051,7 @@
           <a:p>
             <a:fld id="{58BF7D01-7D49-4F37-AA30-F04C65571A4A}" type="datetimeFigureOut">
               <a:rPr lang="ru-RU" smtClean="0"/>
-              <a:t>10.09.2023</a:t>
+              <a:t>16.09.2023</a:t>
             </a:fld>
             <a:endParaRPr lang="ru-RU"/>
           </a:p>
@@ -2221,7 +2221,7 @@
           <a:p>
             <a:fld id="{58BF7D01-7D49-4F37-AA30-F04C65571A4A}" type="datetimeFigureOut">
               <a:rPr lang="ru-RU" smtClean="0"/>
-              <a:t>10.09.2023</a:t>
+              <a:t>16.09.2023</a:t>
             </a:fld>
             <a:endParaRPr lang="ru-RU"/>
           </a:p>
@@ -2401,7 +2401,7 @@
           <a:p>
             <a:fld id="{58BF7D01-7D49-4F37-AA30-F04C65571A4A}" type="datetimeFigureOut">
               <a:rPr lang="ru-RU" smtClean="0"/>
-              <a:t>10.09.2023</a:t>
+              <a:t>16.09.2023</a:t>
             </a:fld>
             <a:endParaRPr lang="ru-RU"/>
           </a:p>
@@ -2571,7 +2571,7 @@
           <a:p>
             <a:fld id="{58BF7D01-7D49-4F37-AA30-F04C65571A4A}" type="datetimeFigureOut">
               <a:rPr lang="ru-RU" smtClean="0"/>
-              <a:t>10.09.2023</a:t>
+              <a:t>16.09.2023</a:t>
             </a:fld>
             <a:endParaRPr lang="ru-RU"/>
           </a:p>
@@ -2817,7 +2817,7 @@
           <a:p>
             <a:fld id="{58BF7D01-7D49-4F37-AA30-F04C65571A4A}" type="datetimeFigureOut">
               <a:rPr lang="ru-RU" smtClean="0"/>
-              <a:t>10.09.2023</a:t>
+              <a:t>16.09.2023</a:t>
             </a:fld>
             <a:endParaRPr lang="ru-RU"/>
           </a:p>
@@ -3049,7 +3049,7 @@
           <a:p>
             <a:fld id="{58BF7D01-7D49-4F37-AA30-F04C65571A4A}" type="datetimeFigureOut">
               <a:rPr lang="ru-RU" smtClean="0"/>
-              <a:t>10.09.2023</a:t>
+              <a:t>16.09.2023</a:t>
             </a:fld>
             <a:endParaRPr lang="ru-RU"/>
           </a:p>
@@ -3416,7 +3416,7 @@
           <a:p>
             <a:fld id="{58BF7D01-7D49-4F37-AA30-F04C65571A4A}" type="datetimeFigureOut">
               <a:rPr lang="ru-RU" smtClean="0"/>
-              <a:t>10.09.2023</a:t>
+              <a:t>16.09.2023</a:t>
             </a:fld>
             <a:endParaRPr lang="ru-RU"/>
           </a:p>
@@ -3534,7 +3534,7 @@
           <a:p>
             <a:fld id="{58BF7D01-7D49-4F37-AA30-F04C65571A4A}" type="datetimeFigureOut">
               <a:rPr lang="ru-RU" smtClean="0"/>
-              <a:t>10.09.2023</a:t>
+              <a:t>16.09.2023</a:t>
             </a:fld>
             <a:endParaRPr lang="ru-RU"/>
           </a:p>
@@ -3629,7 +3629,7 @@
           <a:p>
             <a:fld id="{58BF7D01-7D49-4F37-AA30-F04C65571A4A}" type="datetimeFigureOut">
               <a:rPr lang="ru-RU" smtClean="0"/>
-              <a:t>10.09.2023</a:t>
+              <a:t>16.09.2023</a:t>
             </a:fld>
             <a:endParaRPr lang="ru-RU"/>
           </a:p>
@@ -3906,7 +3906,7 @@
           <a:p>
             <a:fld id="{58BF7D01-7D49-4F37-AA30-F04C65571A4A}" type="datetimeFigureOut">
               <a:rPr lang="ru-RU" smtClean="0"/>
-              <a:t>10.09.2023</a:t>
+              <a:t>16.09.2023</a:t>
             </a:fld>
             <a:endParaRPr lang="ru-RU"/>
           </a:p>
@@ -4163,7 +4163,7 @@
           <a:p>
             <a:fld id="{58BF7D01-7D49-4F37-AA30-F04C65571A4A}" type="datetimeFigureOut">
               <a:rPr lang="ru-RU" smtClean="0"/>
-              <a:t>10.09.2023</a:t>
+              <a:t>16.09.2023</a:t>
             </a:fld>
             <a:endParaRPr lang="ru-RU"/>
           </a:p>
@@ -4376,7 +4376,7 @@
           <a:p>
             <a:fld id="{58BF7D01-7D49-4F37-AA30-F04C65571A4A}" type="datetimeFigureOut">
               <a:rPr lang="ru-RU" smtClean="0"/>
-              <a:t>10.09.2023</a:t>
+              <a:t>16.09.2023</a:t>
             </a:fld>
             <a:endParaRPr lang="ru-RU"/>
           </a:p>
@@ -4805,7 +4805,14 @@
               <a:rPr lang="en-US" dirty="0"/>
               <a:t>C Programming</a:t>
             </a:r>
-            <a:endParaRPr lang="ru-RU" dirty="0"/>
+            <a:br>
+              <a:rPr lang="en-US" dirty="0"/>
+            </a:br>
+            <a:r>
+              <a:rPr lang="en-US" sz="3200" dirty="0"/>
+              <a:t>0_introduction</a:t>
+            </a:r>
+            <a:endParaRPr lang="ru-RU" sz="3200" dirty="0"/>
           </a:p>
         </p:txBody>
       </p:sp>

</xml_diff>